<commit_message>
Chore : Add Image of Variable In Window
</commit_message>
<xml_diff>
--- a/cards/ImageSource.pptx
+++ b/cards/ImageSource.pptx
@@ -6,6 +6,7 @@
   </p:sldMasterIdLst>
   <p:sldIdLst>
     <p:sldId id="256" r:id="rId2"/>
+    <p:sldId id="257" r:id="rId3"/>
   </p:sldIdLst>
   <p:sldSz cx="12192000" cy="6858000"/>
   <p:notesSz cx="6858000" cy="9144000"/>
@@ -104,6 +105,11 @@
       </a:defRPr>
     </a:lvl9pPr>
   </p:defaultTextStyle>
+  <p:extLst>
+    <p:ext uri="{EFAFB233-063F-42B5-8137-9DF3F51BA10A}">
+      <p15:sldGuideLst xmlns:p15="http://schemas.microsoft.com/office/powerpoint/2012/main"/>
+    </p:ext>
+  </p:extLst>
 </p:presentation>
 </file>
 
@@ -4651,7 +4657,39 @@
                   </a:outerShdw>
                 </a:effectLst>
               </a:rPr>
-              <a:t>(3) Instances of class CARD owned by “Dealer_” </a:t>
+              <a:t>(3) Instances of class </a:t>
+            </a:r>
+            <a:r>
+              <a:rPr lang="en-US" b="1" dirty="0">
+                <a:ln w="0"/>
+                <a:solidFill>
+                  <a:schemeClr val="tx1"/>
+                </a:solidFill>
+                <a:effectLst>
+                  <a:outerShdw blurRad="38100" dist="19050" dir="2700000" algn="tl" rotWithShape="0">
+                    <a:schemeClr val="dk1">
+                      <a:alpha val="40000"/>
+                    </a:schemeClr>
+                  </a:outerShdw>
+                </a:effectLst>
+              </a:rPr>
+              <a:t>Card</a:t>
+            </a:r>
+            <a:r>
+              <a:rPr lang="en-US" dirty="0">
+                <a:ln w="0"/>
+                <a:solidFill>
+                  <a:schemeClr val="tx1"/>
+                </a:solidFill>
+                <a:effectLst>
+                  <a:outerShdw blurRad="38100" dist="19050" dir="2700000" algn="tl" rotWithShape="0">
+                    <a:schemeClr val="dk1">
+                      <a:alpha val="40000"/>
+                    </a:schemeClr>
+                  </a:outerShdw>
+                </a:effectLst>
+              </a:rPr>
+              <a:t> owned by “Dealer_” </a:t>
             </a:r>
             <a:r>
               <a:rPr lang="en-US" dirty="0" err="1">
@@ -4770,7 +4808,39 @@
                   </a:outerShdw>
                 </a:effectLst>
               </a:rPr>
-              <a:t>(4) Instances of class CARD owned by “Player_” </a:t>
+              <a:t>(4) Instances of class </a:t>
+            </a:r>
+            <a:r>
+              <a:rPr lang="en-US" b="1" dirty="0">
+                <a:ln w="0"/>
+                <a:solidFill>
+                  <a:schemeClr val="tx1"/>
+                </a:solidFill>
+                <a:effectLst>
+                  <a:outerShdw blurRad="38100" dist="19050" dir="2700000" algn="tl" rotWithShape="0">
+                    <a:schemeClr val="dk1">
+                      <a:alpha val="40000"/>
+                    </a:schemeClr>
+                  </a:outerShdw>
+                </a:effectLst>
+              </a:rPr>
+              <a:t>Card</a:t>
+            </a:r>
+            <a:r>
+              <a:rPr lang="en-US" dirty="0">
+                <a:ln w="0"/>
+                <a:solidFill>
+                  <a:schemeClr val="tx1"/>
+                </a:solidFill>
+                <a:effectLst>
+                  <a:outerShdw blurRad="38100" dist="19050" dir="2700000" algn="tl" rotWithShape="0">
+                    <a:schemeClr val="dk1">
+                      <a:alpha val="40000"/>
+                    </a:schemeClr>
+                  </a:outerShdw>
+                </a:effectLst>
+              </a:rPr>
+              <a:t> owned by “Player_” </a:t>
             </a:r>
             <a:r>
               <a:rPr lang="en-US" dirty="0" err="1">
@@ -4824,6 +4894,2441 @@
     <p:extLst>
       <p:ext uri="{BB962C8B-B14F-4D97-AF65-F5344CB8AC3E}">
         <p14:creationId xmlns:p14="http://schemas.microsoft.com/office/powerpoint/2010/main" val="2529073793"/>
+      </p:ext>
+    </p:extLst>
+  </p:cSld>
+  <p:clrMapOvr>
+    <a:masterClrMapping/>
+  </p:clrMapOvr>
+</p:sld>
+</file>
+
+<file path=ppt/slides/slide2.xml><?xml version="1.0" encoding="utf-8"?>
+<p:sld xmlns:a="http://schemas.openxmlformats.org/drawingml/2006/main" xmlns:r="http://schemas.openxmlformats.org/officeDocument/2006/relationships" xmlns:p="http://schemas.openxmlformats.org/presentationml/2006/main">
+  <p:cSld>
+    <p:spTree>
+      <p:nvGrpSpPr>
+        <p:cNvPr id="1" name=""/>
+        <p:cNvGrpSpPr/>
+        <p:nvPr/>
+      </p:nvGrpSpPr>
+      <p:grpSpPr>
+        <a:xfrm>
+          <a:off x="0" y="0"/>
+          <a:ext cx="0" cy="0"/>
+          <a:chOff x="0" y="0"/>
+          <a:chExt cx="0" cy="0"/>
+        </a:xfrm>
+      </p:grpSpPr>
+      <p:pic>
+        <p:nvPicPr>
+          <p:cNvPr id="4" name="Picture 3">
+            <a:extLst>
+              <a:ext uri="{FF2B5EF4-FFF2-40B4-BE49-F238E27FC236}">
+                <a16:creationId xmlns:a16="http://schemas.microsoft.com/office/drawing/2014/main" id="{F5BF76FE-12DF-452A-B586-702F8A724875}"/>
+              </a:ext>
+            </a:extLst>
+          </p:cNvPr>
+          <p:cNvPicPr>
+            <a:picLocks noChangeAspect="1"/>
+          </p:cNvPicPr>
+          <p:nvPr/>
+        </p:nvPicPr>
+        <p:blipFill>
+          <a:blip r:embed="rId2"/>
+          <a:stretch>
+            <a:fillRect/>
+          </a:stretch>
+        </p:blipFill>
+        <p:spPr>
+          <a:xfrm>
+            <a:off x="2410759" y="1482757"/>
+            <a:ext cx="7370483" cy="4992065"/>
+          </a:xfrm>
+          <a:prstGeom prst="rect">
+            <a:avLst/>
+          </a:prstGeom>
+        </p:spPr>
+      </p:pic>
+      <p:sp>
+        <p:nvSpPr>
+          <p:cNvPr id="89" name="Rectangle 88">
+            <a:extLst>
+              <a:ext uri="{FF2B5EF4-FFF2-40B4-BE49-F238E27FC236}">
+                <a16:creationId xmlns:a16="http://schemas.microsoft.com/office/drawing/2014/main" id="{50D09274-2422-4A24-A75C-30AEED3AE471}"/>
+              </a:ext>
+            </a:extLst>
+          </p:cNvPr>
+          <p:cNvSpPr/>
+          <p:nvPr/>
+        </p:nvSpPr>
+        <p:spPr>
+          <a:xfrm>
+            <a:off x="8497979" y="5631693"/>
+            <a:ext cx="1018755" cy="661851"/>
+          </a:xfrm>
+          <a:prstGeom prst="rect">
+            <a:avLst/>
+          </a:prstGeom>
+          <a:solidFill>
+            <a:srgbClr val="ED7D31">
+              <a:alpha val="40000"/>
+            </a:srgbClr>
+          </a:solidFill>
+        </p:spPr>
+        <p:style>
+          <a:lnRef idx="2">
+            <a:schemeClr val="accent2">
+              <a:shade val="50000"/>
+            </a:schemeClr>
+          </a:lnRef>
+          <a:fillRef idx="1">
+            <a:schemeClr val="accent2"/>
+          </a:fillRef>
+          <a:effectRef idx="0">
+            <a:schemeClr val="accent2"/>
+          </a:effectRef>
+          <a:fontRef idx="minor">
+            <a:schemeClr val="lt1"/>
+          </a:fontRef>
+        </p:style>
+        <p:txBody>
+          <a:bodyPr rtlCol="0" anchor="ctr"/>
+          <a:lstStyle/>
+          <a:p>
+            <a:pPr algn="ctr"/>
+            <a:endParaRPr lang="en-CA"/>
+          </a:p>
+        </p:txBody>
+      </p:sp>
+      <p:sp>
+        <p:nvSpPr>
+          <p:cNvPr id="90" name="Rectangle 89">
+            <a:extLst>
+              <a:ext uri="{FF2B5EF4-FFF2-40B4-BE49-F238E27FC236}">
+                <a16:creationId xmlns:a16="http://schemas.microsoft.com/office/drawing/2014/main" id="{C76159AA-ED21-4605-A3A9-52EB189C0E91}"/>
+              </a:ext>
+            </a:extLst>
+          </p:cNvPr>
+          <p:cNvSpPr/>
+          <p:nvPr/>
+        </p:nvSpPr>
+        <p:spPr>
+          <a:xfrm>
+            <a:off x="10014011" y="5553315"/>
+            <a:ext cx="1718356" cy="439784"/>
+          </a:xfrm>
+          <a:prstGeom prst="rect">
+            <a:avLst/>
+          </a:prstGeom>
+          <a:solidFill>
+            <a:srgbClr val="ED7D31"/>
+          </a:solidFill>
+        </p:spPr>
+        <p:style>
+          <a:lnRef idx="2">
+            <a:schemeClr val="accent2">
+              <a:shade val="50000"/>
+            </a:schemeClr>
+          </a:lnRef>
+          <a:fillRef idx="1">
+            <a:schemeClr val="accent2"/>
+          </a:fillRef>
+          <a:effectRef idx="0">
+            <a:schemeClr val="accent2"/>
+          </a:effectRef>
+          <a:fontRef idx="minor">
+            <a:schemeClr val="lt1"/>
+          </a:fontRef>
+        </p:style>
+        <p:txBody>
+          <a:bodyPr rtlCol="0" anchor="ctr"/>
+          <a:lstStyle/>
+          <a:p>
+            <a:pPr algn="ctr"/>
+            <a:r>
+              <a:rPr lang="en-CA" sz="1100" dirty="0" err="1"/>
+              <a:t>QGroupBox</a:t>
+            </a:r>
+            <a:r>
+              <a:rPr lang="en-CA" sz="1100" dirty="0"/>
+              <a:t> </a:t>
+            </a:r>
+            <a:r>
+              <a:rPr lang="en-CA" sz="1100" b="1" dirty="0"/>
+              <a:t>*</a:t>
+            </a:r>
+            <a:r>
+              <a:rPr lang="en-CA" sz="1100" b="1" dirty="0" err="1"/>
+              <a:t>PlayersFundPrompt</a:t>
+            </a:r>
+            <a:r>
+              <a:rPr lang="en-CA" sz="1100" b="1" dirty="0"/>
+              <a:t>_</a:t>
+            </a:r>
+          </a:p>
+        </p:txBody>
+      </p:sp>
+      <p:cxnSp>
+        <p:nvCxnSpPr>
+          <p:cNvPr id="91" name="Straight Connector 90">
+            <a:extLst>
+              <a:ext uri="{FF2B5EF4-FFF2-40B4-BE49-F238E27FC236}">
+                <a16:creationId xmlns:a16="http://schemas.microsoft.com/office/drawing/2014/main" id="{030AC022-B382-4281-AEC7-776D11F94C41}"/>
+              </a:ext>
+            </a:extLst>
+          </p:cNvPr>
+          <p:cNvCxnSpPr>
+            <a:cxnSpLocks/>
+            <a:stCxn id="89" idx="3"/>
+            <a:endCxn id="90" idx="1"/>
+          </p:cNvCxnSpPr>
+          <p:nvPr/>
+        </p:nvCxnSpPr>
+        <p:spPr>
+          <a:xfrm flipV="1">
+            <a:off x="9516734" y="5773207"/>
+            <a:ext cx="497277" cy="189412"/>
+          </a:xfrm>
+          <a:prstGeom prst="line">
+            <a:avLst/>
+          </a:prstGeom>
+          <a:ln w="28575"/>
+        </p:spPr>
+        <p:style>
+          <a:lnRef idx="1">
+            <a:schemeClr val="accent2"/>
+          </a:lnRef>
+          <a:fillRef idx="0">
+            <a:schemeClr val="accent2"/>
+          </a:fillRef>
+          <a:effectRef idx="0">
+            <a:schemeClr val="accent2"/>
+          </a:effectRef>
+          <a:fontRef idx="minor">
+            <a:schemeClr val="tx1"/>
+          </a:fontRef>
+        </p:style>
+      </p:cxnSp>
+      <p:sp>
+        <p:nvSpPr>
+          <p:cNvPr id="6" name="Rectangle 5">
+            <a:extLst>
+              <a:ext uri="{FF2B5EF4-FFF2-40B4-BE49-F238E27FC236}">
+                <a16:creationId xmlns:a16="http://schemas.microsoft.com/office/drawing/2014/main" id="{838E344A-ACDA-43C4-8E1D-396762E15581}"/>
+              </a:ext>
+            </a:extLst>
+          </p:cNvPr>
+          <p:cNvSpPr/>
+          <p:nvPr/>
+        </p:nvSpPr>
+        <p:spPr>
+          <a:xfrm>
+            <a:off x="2410758" y="1482756"/>
+            <a:ext cx="7370483" cy="4992065"/>
+          </a:xfrm>
+          <a:prstGeom prst="rect">
+            <a:avLst/>
+          </a:prstGeom>
+          <a:noFill/>
+          <a:ln w="57150">
+            <a:solidFill>
+              <a:srgbClr val="FF0000"/>
+            </a:solidFill>
+            <a:prstDash val="dashDot"/>
+          </a:ln>
+        </p:spPr>
+        <p:style>
+          <a:lnRef idx="2">
+            <a:schemeClr val="accent1">
+              <a:shade val="50000"/>
+            </a:schemeClr>
+          </a:lnRef>
+          <a:fillRef idx="1">
+            <a:schemeClr val="accent1"/>
+          </a:fillRef>
+          <a:effectRef idx="0">
+            <a:schemeClr val="accent1"/>
+          </a:effectRef>
+          <a:fontRef idx="minor">
+            <a:schemeClr val="lt1"/>
+          </a:fontRef>
+        </p:style>
+        <p:txBody>
+          <a:bodyPr rtlCol="0" anchor="ctr"/>
+          <a:lstStyle/>
+          <a:p>
+            <a:pPr algn="ctr"/>
+            <a:endParaRPr lang="en-CA"/>
+          </a:p>
+        </p:txBody>
+      </p:sp>
+      <p:cxnSp>
+        <p:nvCxnSpPr>
+          <p:cNvPr id="8" name="Straight Connector 7">
+            <a:extLst>
+              <a:ext uri="{FF2B5EF4-FFF2-40B4-BE49-F238E27FC236}">
+                <a16:creationId xmlns:a16="http://schemas.microsoft.com/office/drawing/2014/main" id="{BEF99D5A-0A6A-4622-8C98-EE7F871C126B}"/>
+              </a:ext>
+            </a:extLst>
+          </p:cNvPr>
+          <p:cNvCxnSpPr>
+            <a:cxnSpLocks/>
+          </p:cNvCxnSpPr>
+          <p:nvPr/>
+        </p:nvCxnSpPr>
+        <p:spPr>
+          <a:xfrm flipH="1" flipV="1">
+            <a:off x="1626988" y="1227908"/>
+            <a:ext cx="783770" cy="330926"/>
+          </a:xfrm>
+          <a:prstGeom prst="line">
+            <a:avLst/>
+          </a:prstGeom>
+          <a:ln w="57150">
+            <a:solidFill>
+              <a:srgbClr val="FF0000"/>
+            </a:solidFill>
+            <a:prstDash val="sysDash"/>
+          </a:ln>
+        </p:spPr>
+        <p:style>
+          <a:lnRef idx="1">
+            <a:schemeClr val="accent1"/>
+          </a:lnRef>
+          <a:fillRef idx="0">
+            <a:schemeClr val="accent1"/>
+          </a:fillRef>
+          <a:effectRef idx="0">
+            <a:schemeClr val="accent1"/>
+          </a:effectRef>
+          <a:fontRef idx="minor">
+            <a:schemeClr val="tx1"/>
+          </a:fontRef>
+        </p:style>
+      </p:cxnSp>
+      <p:sp>
+        <p:nvSpPr>
+          <p:cNvPr id="10" name="Rectangle 9">
+            <a:extLst>
+              <a:ext uri="{FF2B5EF4-FFF2-40B4-BE49-F238E27FC236}">
+                <a16:creationId xmlns:a16="http://schemas.microsoft.com/office/drawing/2014/main" id="{CF80389C-16E0-4EA1-A20C-88A0B061E18A}"/>
+              </a:ext>
+            </a:extLst>
+          </p:cNvPr>
+          <p:cNvSpPr/>
+          <p:nvPr/>
+        </p:nvSpPr>
+        <p:spPr>
+          <a:xfrm>
+            <a:off x="390370" y="957943"/>
+            <a:ext cx="1297578" cy="896982"/>
+          </a:xfrm>
+          <a:prstGeom prst="rect">
+            <a:avLst/>
+          </a:prstGeom>
+          <a:solidFill>
+            <a:srgbClr val="FF0000"/>
+          </a:solidFill>
+          <a:ln>
+            <a:solidFill>
+              <a:srgbClr val="FF0000"/>
+            </a:solidFill>
+          </a:ln>
+        </p:spPr>
+        <p:style>
+          <a:lnRef idx="2">
+            <a:schemeClr val="accent2">
+              <a:shade val="50000"/>
+            </a:schemeClr>
+          </a:lnRef>
+          <a:fillRef idx="1">
+            <a:schemeClr val="accent2"/>
+          </a:fillRef>
+          <a:effectRef idx="0">
+            <a:schemeClr val="accent2"/>
+          </a:effectRef>
+          <a:fontRef idx="minor">
+            <a:schemeClr val="lt1"/>
+          </a:fontRef>
+        </p:style>
+        <p:txBody>
+          <a:bodyPr rtlCol="0" anchor="ctr"/>
+          <a:lstStyle/>
+          <a:p>
+            <a:pPr algn="ctr"/>
+            <a:r>
+              <a:rPr lang="en-US" sz="1600" dirty="0" err="1"/>
+              <a:t>QGridLayout</a:t>
+            </a:r>
+            <a:r>
+              <a:rPr lang="en-US" sz="1600" b="1" dirty="0"/>
+              <a:t> *</a:t>
+            </a:r>
+            <a:r>
+              <a:rPr lang="en-US" sz="1600" b="1" dirty="0" err="1"/>
+              <a:t>GameGrid</a:t>
+            </a:r>
+            <a:r>
+              <a:rPr lang="en-US" sz="1600" b="1" dirty="0"/>
+              <a:t>_</a:t>
+            </a:r>
+            <a:endParaRPr lang="en-CA" sz="1600" b="1" dirty="0"/>
+          </a:p>
+        </p:txBody>
+      </p:sp>
+      <p:sp>
+        <p:nvSpPr>
+          <p:cNvPr id="13" name="Rectangle 12">
+            <a:extLst>
+              <a:ext uri="{FF2B5EF4-FFF2-40B4-BE49-F238E27FC236}">
+                <a16:creationId xmlns:a16="http://schemas.microsoft.com/office/drawing/2014/main" id="{F7020CE8-4FD8-4F4B-9491-464C7B9DC681}"/>
+              </a:ext>
+            </a:extLst>
+          </p:cNvPr>
+          <p:cNvSpPr/>
+          <p:nvPr/>
+        </p:nvSpPr>
+        <p:spPr>
+          <a:xfrm>
+            <a:off x="2541387" y="2037805"/>
+            <a:ext cx="5669280" cy="2063932"/>
+          </a:xfrm>
+          <a:prstGeom prst="rect">
+            <a:avLst/>
+          </a:prstGeom>
+          <a:solidFill>
+            <a:srgbClr val="4472C4">
+              <a:alpha val="30196"/>
+            </a:srgbClr>
+          </a:solidFill>
+          <a:ln w="38100">
+            <a:prstDash val="sysDash"/>
+          </a:ln>
+        </p:spPr>
+        <p:style>
+          <a:lnRef idx="2">
+            <a:schemeClr val="accent1">
+              <a:shade val="50000"/>
+            </a:schemeClr>
+          </a:lnRef>
+          <a:fillRef idx="1">
+            <a:schemeClr val="accent1"/>
+          </a:fillRef>
+          <a:effectRef idx="0">
+            <a:schemeClr val="accent1"/>
+          </a:effectRef>
+          <a:fontRef idx="minor">
+            <a:schemeClr val="lt1"/>
+          </a:fontRef>
+        </p:style>
+        <p:txBody>
+          <a:bodyPr rtlCol="0" anchor="ctr"/>
+          <a:lstStyle/>
+          <a:p>
+            <a:pPr algn="ctr"/>
+            <a:endParaRPr lang="en-CA"/>
+          </a:p>
+        </p:txBody>
+      </p:sp>
+      <p:sp>
+        <p:nvSpPr>
+          <p:cNvPr id="14" name="Rectangle 13">
+            <a:extLst>
+              <a:ext uri="{FF2B5EF4-FFF2-40B4-BE49-F238E27FC236}">
+                <a16:creationId xmlns:a16="http://schemas.microsoft.com/office/drawing/2014/main" id="{F01699A6-0617-4B05-A440-EE877C8A6440}"/>
+              </a:ext>
+            </a:extLst>
+          </p:cNvPr>
+          <p:cNvSpPr/>
+          <p:nvPr/>
+        </p:nvSpPr>
+        <p:spPr>
+          <a:xfrm>
+            <a:off x="2615410" y="4356585"/>
+            <a:ext cx="5669280" cy="2063932"/>
+          </a:xfrm>
+          <a:prstGeom prst="rect">
+            <a:avLst/>
+          </a:prstGeom>
+          <a:solidFill>
+            <a:srgbClr val="4472C4">
+              <a:alpha val="30196"/>
+            </a:srgbClr>
+          </a:solidFill>
+          <a:ln w="38100">
+            <a:prstDash val="sysDash"/>
+          </a:ln>
+        </p:spPr>
+        <p:style>
+          <a:lnRef idx="2">
+            <a:schemeClr val="accent1">
+              <a:shade val="50000"/>
+            </a:schemeClr>
+          </a:lnRef>
+          <a:fillRef idx="1">
+            <a:schemeClr val="accent1"/>
+          </a:fillRef>
+          <a:effectRef idx="0">
+            <a:schemeClr val="accent1"/>
+          </a:effectRef>
+          <a:fontRef idx="minor">
+            <a:schemeClr val="lt1"/>
+          </a:fontRef>
+        </p:style>
+        <p:txBody>
+          <a:bodyPr rtlCol="0" anchor="ctr"/>
+          <a:lstStyle/>
+          <a:p>
+            <a:pPr algn="ctr"/>
+            <a:endParaRPr lang="en-CA"/>
+          </a:p>
+        </p:txBody>
+      </p:sp>
+      <p:cxnSp>
+        <p:nvCxnSpPr>
+          <p:cNvPr id="16" name="Straight Connector 15">
+            <a:extLst>
+              <a:ext uri="{FF2B5EF4-FFF2-40B4-BE49-F238E27FC236}">
+                <a16:creationId xmlns:a16="http://schemas.microsoft.com/office/drawing/2014/main" id="{5A20D832-E613-4395-9200-75AD8253A96A}"/>
+              </a:ext>
+            </a:extLst>
+          </p:cNvPr>
+          <p:cNvCxnSpPr>
+            <a:cxnSpLocks/>
+            <a:stCxn id="13" idx="1"/>
+            <a:endCxn id="38" idx="3"/>
+          </p:cNvCxnSpPr>
+          <p:nvPr/>
+        </p:nvCxnSpPr>
+        <p:spPr>
+          <a:xfrm flipH="1">
+            <a:off x="1907176" y="3069771"/>
+            <a:ext cx="634211" cy="238317"/>
+          </a:xfrm>
+          <a:prstGeom prst="line">
+            <a:avLst/>
+          </a:prstGeom>
+          <a:ln w="57150">
+            <a:solidFill>
+              <a:schemeClr val="tx2"/>
+            </a:solidFill>
+          </a:ln>
+        </p:spPr>
+        <p:style>
+          <a:lnRef idx="1">
+            <a:schemeClr val="accent1"/>
+          </a:lnRef>
+          <a:fillRef idx="0">
+            <a:schemeClr val="accent1"/>
+          </a:fillRef>
+          <a:effectRef idx="0">
+            <a:schemeClr val="accent1"/>
+          </a:effectRef>
+          <a:fontRef idx="minor">
+            <a:schemeClr val="tx1"/>
+          </a:fontRef>
+        </p:style>
+      </p:cxnSp>
+      <p:cxnSp>
+        <p:nvCxnSpPr>
+          <p:cNvPr id="18" name="Straight Connector 17">
+            <a:extLst>
+              <a:ext uri="{FF2B5EF4-FFF2-40B4-BE49-F238E27FC236}">
+                <a16:creationId xmlns:a16="http://schemas.microsoft.com/office/drawing/2014/main" id="{B1C1EF64-5BBB-479C-AE6C-ABBF91BAC425}"/>
+              </a:ext>
+            </a:extLst>
+          </p:cNvPr>
+          <p:cNvCxnSpPr>
+            <a:cxnSpLocks/>
+            <a:endCxn id="23" idx="3"/>
+          </p:cNvCxnSpPr>
+          <p:nvPr/>
+        </p:nvCxnSpPr>
+        <p:spPr>
+          <a:xfrm flipH="1">
+            <a:off x="1878122" y="5522223"/>
+            <a:ext cx="702504" cy="128345"/>
+          </a:xfrm>
+          <a:prstGeom prst="line">
+            <a:avLst/>
+          </a:prstGeom>
+          <a:ln w="57150">
+            <a:solidFill>
+              <a:schemeClr val="tx2"/>
+            </a:solidFill>
+          </a:ln>
+        </p:spPr>
+        <p:style>
+          <a:lnRef idx="1">
+            <a:schemeClr val="accent1"/>
+          </a:lnRef>
+          <a:fillRef idx="0">
+            <a:schemeClr val="accent1"/>
+          </a:fillRef>
+          <a:effectRef idx="0">
+            <a:schemeClr val="accent1"/>
+          </a:effectRef>
+          <a:fontRef idx="minor">
+            <a:schemeClr val="tx1"/>
+          </a:fontRef>
+        </p:style>
+      </p:cxnSp>
+      <p:sp>
+        <p:nvSpPr>
+          <p:cNvPr id="23" name="Rectangle 22">
+            <a:extLst>
+              <a:ext uri="{FF2B5EF4-FFF2-40B4-BE49-F238E27FC236}">
+                <a16:creationId xmlns:a16="http://schemas.microsoft.com/office/drawing/2014/main" id="{21DFC16C-9F61-4557-9195-BA693D0501B8}"/>
+              </a:ext>
+            </a:extLst>
+          </p:cNvPr>
+          <p:cNvSpPr/>
+          <p:nvPr/>
+        </p:nvSpPr>
+        <p:spPr>
+          <a:xfrm>
+            <a:off x="153826" y="5408885"/>
+            <a:ext cx="1724296" cy="483366"/>
+          </a:xfrm>
+          <a:prstGeom prst="rect">
+            <a:avLst/>
+          </a:prstGeom>
+          <a:solidFill>
+            <a:schemeClr val="tx2">
+              <a:lumMod val="60000"/>
+              <a:lumOff val="40000"/>
+            </a:schemeClr>
+          </a:solidFill>
+          <a:ln w="38100">
+            <a:solidFill>
+              <a:schemeClr val="tx2"/>
+            </a:solidFill>
+          </a:ln>
+        </p:spPr>
+        <p:style>
+          <a:lnRef idx="2">
+            <a:schemeClr val="accent2">
+              <a:shade val="50000"/>
+            </a:schemeClr>
+          </a:lnRef>
+          <a:fillRef idx="1">
+            <a:schemeClr val="accent2"/>
+          </a:fillRef>
+          <a:effectRef idx="0">
+            <a:schemeClr val="accent2"/>
+          </a:effectRef>
+          <a:fontRef idx="minor">
+            <a:schemeClr val="lt1"/>
+          </a:fontRef>
+        </p:style>
+        <p:txBody>
+          <a:bodyPr rtlCol="0" anchor="ctr"/>
+          <a:lstStyle/>
+          <a:p>
+            <a:pPr algn="ctr"/>
+            <a:r>
+              <a:rPr lang="en-CA" sz="1000" dirty="0" err="1"/>
+              <a:t>QGroupBox</a:t>
+            </a:r>
+            <a:r>
+              <a:rPr lang="en-CA" sz="1000" b="1" dirty="0"/>
+              <a:t> *</a:t>
+            </a:r>
+            <a:r>
+              <a:rPr lang="en-CA" sz="1000" b="1" dirty="0" err="1"/>
+              <a:t>PlayersCardPrompt</a:t>
+            </a:r>
+            <a:r>
+              <a:rPr lang="en-CA" sz="1000" b="1" dirty="0"/>
+              <a:t>_</a:t>
+            </a:r>
+          </a:p>
+        </p:txBody>
+      </p:sp>
+      <p:sp>
+        <p:nvSpPr>
+          <p:cNvPr id="24" name="Rectangle: Rounded Corners 23">
+            <a:extLst>
+              <a:ext uri="{FF2B5EF4-FFF2-40B4-BE49-F238E27FC236}">
+                <a16:creationId xmlns:a16="http://schemas.microsoft.com/office/drawing/2014/main" id="{7362FED7-A032-4D38-8B43-6676999FE97F}"/>
+              </a:ext>
+            </a:extLst>
+          </p:cNvPr>
+          <p:cNvSpPr/>
+          <p:nvPr/>
+        </p:nvSpPr>
+        <p:spPr>
+          <a:xfrm>
+            <a:off x="2628470" y="2360023"/>
+            <a:ext cx="1220715" cy="1654628"/>
+          </a:xfrm>
+          <a:prstGeom prst="roundRect">
+            <a:avLst/>
+          </a:prstGeom>
+          <a:solidFill>
+            <a:schemeClr val="accent6">
+              <a:lumMod val="60000"/>
+              <a:lumOff val="40000"/>
+              <a:alpha val="30196"/>
+            </a:schemeClr>
+          </a:solidFill>
+        </p:spPr>
+        <p:style>
+          <a:lnRef idx="2">
+            <a:schemeClr val="accent1">
+              <a:shade val="50000"/>
+            </a:schemeClr>
+          </a:lnRef>
+          <a:fillRef idx="1">
+            <a:schemeClr val="accent1"/>
+          </a:fillRef>
+          <a:effectRef idx="0">
+            <a:schemeClr val="accent1"/>
+          </a:effectRef>
+          <a:fontRef idx="minor">
+            <a:schemeClr val="lt1"/>
+          </a:fontRef>
+        </p:style>
+        <p:txBody>
+          <a:bodyPr rtlCol="0" anchor="ctr"/>
+          <a:lstStyle/>
+          <a:p>
+            <a:pPr algn="ctr"/>
+            <a:r>
+              <a:rPr lang="en-US" sz="1000" dirty="0" err="1">
+                <a:ln w="0"/>
+                <a:solidFill>
+                  <a:schemeClr val="accent6">
+                    <a:lumMod val="50000"/>
+                  </a:schemeClr>
+                </a:solidFill>
+                <a:effectLst>
+                  <a:outerShdw blurRad="38100" dist="19050" dir="2700000" algn="tl" rotWithShape="0">
+                    <a:schemeClr val="dk1">
+                      <a:alpha val="40000"/>
+                    </a:schemeClr>
+                  </a:outerShdw>
+                </a:effectLst>
+                <a:highlight>
+                  <a:srgbClr val="FFFF00"/>
+                </a:highlight>
+              </a:rPr>
+              <a:t>QLabel</a:t>
+            </a:r>
+            <a:r>
+              <a:rPr lang="en-US" sz="1000" dirty="0">
+                <a:ln w="0"/>
+                <a:solidFill>
+                  <a:schemeClr val="accent6">
+                    <a:lumMod val="50000"/>
+                  </a:schemeClr>
+                </a:solidFill>
+                <a:effectLst>
+                  <a:outerShdw blurRad="38100" dist="19050" dir="2700000" algn="tl" rotWithShape="0">
+                    <a:schemeClr val="dk1">
+                      <a:alpha val="40000"/>
+                    </a:schemeClr>
+                  </a:outerShdw>
+                </a:effectLst>
+                <a:highlight>
+                  <a:srgbClr val="FFFF00"/>
+                </a:highlight>
+              </a:rPr>
+              <a:t> *</a:t>
+            </a:r>
+            <a:r>
+              <a:rPr lang="en-US" sz="1000" dirty="0" err="1">
+                <a:ln w="0"/>
+                <a:solidFill>
+                  <a:schemeClr val="accent6">
+                    <a:lumMod val="50000"/>
+                  </a:schemeClr>
+                </a:solidFill>
+                <a:effectLst>
+                  <a:outerShdw blurRad="38100" dist="19050" dir="2700000" algn="tl" rotWithShape="0">
+                    <a:schemeClr val="dk1">
+                      <a:alpha val="40000"/>
+                    </a:schemeClr>
+                  </a:outerShdw>
+                </a:effectLst>
+                <a:highlight>
+                  <a:srgbClr val="FFFF00"/>
+                </a:highlight>
+              </a:rPr>
+              <a:t>ParticipantCards</a:t>
+            </a:r>
+            <a:r>
+              <a:rPr lang="en-US" sz="1000" dirty="0">
+                <a:ln w="0"/>
+                <a:solidFill>
+                  <a:schemeClr val="accent6">
+                    <a:lumMod val="50000"/>
+                  </a:schemeClr>
+                </a:solidFill>
+                <a:effectLst>
+                  <a:outerShdw blurRad="38100" dist="19050" dir="2700000" algn="tl" rotWithShape="0">
+                    <a:schemeClr val="dk1">
+                      <a:alpha val="40000"/>
+                    </a:schemeClr>
+                  </a:outerShdw>
+                </a:effectLst>
+                <a:highlight>
+                  <a:srgbClr val="FFFF00"/>
+                </a:highlight>
+              </a:rPr>
+              <a:t>_[0] Owned by Dealer_</a:t>
+            </a:r>
+          </a:p>
+        </p:txBody>
+      </p:sp>
+      <p:sp>
+        <p:nvSpPr>
+          <p:cNvPr id="25" name="Rectangle: Rounded Corners 24">
+            <a:extLst>
+              <a:ext uri="{FF2B5EF4-FFF2-40B4-BE49-F238E27FC236}">
+                <a16:creationId xmlns:a16="http://schemas.microsoft.com/office/drawing/2014/main" id="{7A063CAB-E09E-4C39-9F4D-44501650B24B}"/>
+              </a:ext>
+            </a:extLst>
+          </p:cNvPr>
+          <p:cNvSpPr/>
+          <p:nvPr/>
+        </p:nvSpPr>
+        <p:spPr>
+          <a:xfrm>
+            <a:off x="4024114" y="2360023"/>
+            <a:ext cx="1220715" cy="1654628"/>
+          </a:xfrm>
+          <a:prstGeom prst="roundRect">
+            <a:avLst/>
+          </a:prstGeom>
+          <a:solidFill>
+            <a:schemeClr val="accent6">
+              <a:lumMod val="60000"/>
+              <a:lumOff val="40000"/>
+              <a:alpha val="30196"/>
+            </a:schemeClr>
+          </a:solidFill>
+        </p:spPr>
+        <p:style>
+          <a:lnRef idx="2">
+            <a:schemeClr val="accent1">
+              <a:shade val="50000"/>
+            </a:schemeClr>
+          </a:lnRef>
+          <a:fillRef idx="1">
+            <a:schemeClr val="accent1"/>
+          </a:fillRef>
+          <a:effectRef idx="0">
+            <a:schemeClr val="accent1"/>
+          </a:effectRef>
+          <a:fontRef idx="minor">
+            <a:schemeClr val="lt1"/>
+          </a:fontRef>
+        </p:style>
+        <p:txBody>
+          <a:bodyPr rtlCol="0" anchor="ctr"/>
+          <a:lstStyle/>
+          <a:p>
+            <a:pPr algn="ctr"/>
+            <a:r>
+              <a:rPr lang="en-US" sz="1000" dirty="0" err="1">
+                <a:ln w="0"/>
+                <a:solidFill>
+                  <a:schemeClr val="accent6">
+                    <a:lumMod val="50000"/>
+                  </a:schemeClr>
+                </a:solidFill>
+                <a:effectLst>
+                  <a:outerShdw blurRad="38100" dist="19050" dir="2700000" algn="tl" rotWithShape="0">
+                    <a:schemeClr val="dk1">
+                      <a:alpha val="40000"/>
+                    </a:schemeClr>
+                  </a:outerShdw>
+                </a:effectLst>
+                <a:highlight>
+                  <a:srgbClr val="FFFF00"/>
+                </a:highlight>
+              </a:rPr>
+              <a:t>QLabel</a:t>
+            </a:r>
+            <a:r>
+              <a:rPr lang="en-US" sz="1000" dirty="0">
+                <a:ln w="0"/>
+                <a:solidFill>
+                  <a:schemeClr val="accent6">
+                    <a:lumMod val="50000"/>
+                  </a:schemeClr>
+                </a:solidFill>
+                <a:effectLst>
+                  <a:outerShdw blurRad="38100" dist="19050" dir="2700000" algn="tl" rotWithShape="0">
+                    <a:schemeClr val="dk1">
+                      <a:alpha val="40000"/>
+                    </a:schemeClr>
+                  </a:outerShdw>
+                </a:effectLst>
+                <a:highlight>
+                  <a:srgbClr val="FFFF00"/>
+                </a:highlight>
+              </a:rPr>
+              <a:t> *</a:t>
+            </a:r>
+            <a:r>
+              <a:rPr lang="en-US" sz="1000" dirty="0" err="1">
+                <a:ln w="0"/>
+                <a:solidFill>
+                  <a:schemeClr val="accent6">
+                    <a:lumMod val="50000"/>
+                  </a:schemeClr>
+                </a:solidFill>
+                <a:effectLst>
+                  <a:outerShdw blurRad="38100" dist="19050" dir="2700000" algn="tl" rotWithShape="0">
+                    <a:schemeClr val="dk1">
+                      <a:alpha val="40000"/>
+                    </a:schemeClr>
+                  </a:outerShdw>
+                </a:effectLst>
+                <a:highlight>
+                  <a:srgbClr val="FFFF00"/>
+                </a:highlight>
+              </a:rPr>
+              <a:t>ParticipantCards</a:t>
+            </a:r>
+            <a:r>
+              <a:rPr lang="en-US" sz="1000" dirty="0">
+                <a:ln w="0"/>
+                <a:solidFill>
+                  <a:schemeClr val="accent6">
+                    <a:lumMod val="50000"/>
+                  </a:schemeClr>
+                </a:solidFill>
+                <a:effectLst>
+                  <a:outerShdw blurRad="38100" dist="19050" dir="2700000" algn="tl" rotWithShape="0">
+                    <a:schemeClr val="dk1">
+                      <a:alpha val="40000"/>
+                    </a:schemeClr>
+                  </a:outerShdw>
+                </a:effectLst>
+                <a:highlight>
+                  <a:srgbClr val="FFFF00"/>
+                </a:highlight>
+              </a:rPr>
+              <a:t>_[1] Owned by Dealer_</a:t>
+            </a:r>
+          </a:p>
+        </p:txBody>
+      </p:sp>
+      <p:sp>
+        <p:nvSpPr>
+          <p:cNvPr id="26" name="Rectangle: Rounded Corners 25">
+            <a:extLst>
+              <a:ext uri="{FF2B5EF4-FFF2-40B4-BE49-F238E27FC236}">
+                <a16:creationId xmlns:a16="http://schemas.microsoft.com/office/drawing/2014/main" id="{8AA26B99-777E-45A0-AEFC-8BD16E3022B8}"/>
+              </a:ext>
+            </a:extLst>
+          </p:cNvPr>
+          <p:cNvSpPr/>
+          <p:nvPr/>
+        </p:nvSpPr>
+        <p:spPr>
+          <a:xfrm>
+            <a:off x="5384258" y="2360023"/>
+            <a:ext cx="1217026" cy="1654628"/>
+          </a:xfrm>
+          <a:prstGeom prst="roundRect">
+            <a:avLst/>
+          </a:prstGeom>
+          <a:solidFill>
+            <a:schemeClr val="accent6">
+              <a:lumMod val="60000"/>
+              <a:lumOff val="40000"/>
+              <a:alpha val="30196"/>
+            </a:schemeClr>
+          </a:solidFill>
+        </p:spPr>
+        <p:style>
+          <a:lnRef idx="2">
+            <a:schemeClr val="accent1">
+              <a:shade val="50000"/>
+            </a:schemeClr>
+          </a:lnRef>
+          <a:fillRef idx="1">
+            <a:schemeClr val="accent1"/>
+          </a:fillRef>
+          <a:effectRef idx="0">
+            <a:schemeClr val="accent1"/>
+          </a:effectRef>
+          <a:fontRef idx="minor">
+            <a:schemeClr val="lt1"/>
+          </a:fontRef>
+        </p:style>
+        <p:txBody>
+          <a:bodyPr rtlCol="0" anchor="ctr"/>
+          <a:lstStyle/>
+          <a:p>
+            <a:pPr algn="ctr"/>
+            <a:r>
+              <a:rPr lang="en-US" sz="1000" dirty="0" err="1">
+                <a:ln w="0"/>
+                <a:solidFill>
+                  <a:schemeClr val="accent6">
+                    <a:lumMod val="50000"/>
+                  </a:schemeClr>
+                </a:solidFill>
+                <a:effectLst>
+                  <a:outerShdw blurRad="38100" dist="19050" dir="2700000" algn="tl" rotWithShape="0">
+                    <a:schemeClr val="dk1">
+                      <a:alpha val="40000"/>
+                    </a:schemeClr>
+                  </a:outerShdw>
+                </a:effectLst>
+                <a:highlight>
+                  <a:srgbClr val="FFFF00"/>
+                </a:highlight>
+              </a:rPr>
+              <a:t>QLabel</a:t>
+            </a:r>
+            <a:r>
+              <a:rPr lang="en-US" sz="1000" dirty="0">
+                <a:ln w="0"/>
+                <a:solidFill>
+                  <a:schemeClr val="accent6">
+                    <a:lumMod val="50000"/>
+                  </a:schemeClr>
+                </a:solidFill>
+                <a:effectLst>
+                  <a:outerShdw blurRad="38100" dist="19050" dir="2700000" algn="tl" rotWithShape="0">
+                    <a:schemeClr val="dk1">
+                      <a:alpha val="40000"/>
+                    </a:schemeClr>
+                  </a:outerShdw>
+                </a:effectLst>
+                <a:highlight>
+                  <a:srgbClr val="FFFF00"/>
+                </a:highlight>
+              </a:rPr>
+              <a:t> *</a:t>
+            </a:r>
+            <a:r>
+              <a:rPr lang="en-US" sz="1000" dirty="0" err="1">
+                <a:ln w="0"/>
+                <a:solidFill>
+                  <a:schemeClr val="accent6">
+                    <a:lumMod val="50000"/>
+                  </a:schemeClr>
+                </a:solidFill>
+                <a:effectLst>
+                  <a:outerShdw blurRad="38100" dist="19050" dir="2700000" algn="tl" rotWithShape="0">
+                    <a:schemeClr val="dk1">
+                      <a:alpha val="40000"/>
+                    </a:schemeClr>
+                  </a:outerShdw>
+                </a:effectLst>
+                <a:highlight>
+                  <a:srgbClr val="FFFF00"/>
+                </a:highlight>
+              </a:rPr>
+              <a:t>ParticipantCards</a:t>
+            </a:r>
+            <a:r>
+              <a:rPr lang="en-US" sz="1000" dirty="0">
+                <a:ln w="0"/>
+                <a:solidFill>
+                  <a:schemeClr val="accent6">
+                    <a:lumMod val="50000"/>
+                  </a:schemeClr>
+                </a:solidFill>
+                <a:effectLst>
+                  <a:outerShdw blurRad="38100" dist="19050" dir="2700000" algn="tl" rotWithShape="0">
+                    <a:schemeClr val="dk1">
+                      <a:alpha val="40000"/>
+                    </a:schemeClr>
+                  </a:outerShdw>
+                </a:effectLst>
+                <a:highlight>
+                  <a:srgbClr val="FFFF00"/>
+                </a:highlight>
+              </a:rPr>
+              <a:t>_[2] Owned by Dealer_</a:t>
+            </a:r>
+            <a:endParaRPr lang="en-CA" sz="1000" dirty="0">
+              <a:ln w="0"/>
+              <a:solidFill>
+                <a:schemeClr val="accent6">
+                  <a:lumMod val="50000"/>
+                </a:schemeClr>
+              </a:solidFill>
+              <a:effectLst>
+                <a:outerShdw blurRad="38100" dist="19050" dir="2700000" algn="tl" rotWithShape="0">
+                  <a:schemeClr val="dk1">
+                    <a:alpha val="40000"/>
+                  </a:schemeClr>
+                </a:outerShdw>
+              </a:effectLst>
+              <a:highlight>
+                <a:srgbClr val="FFFF00"/>
+              </a:highlight>
+            </a:endParaRPr>
+          </a:p>
+        </p:txBody>
+      </p:sp>
+      <p:sp>
+        <p:nvSpPr>
+          <p:cNvPr id="27" name="Rectangle: Rounded Corners 26">
+            <a:extLst>
+              <a:ext uri="{FF2B5EF4-FFF2-40B4-BE49-F238E27FC236}">
+                <a16:creationId xmlns:a16="http://schemas.microsoft.com/office/drawing/2014/main" id="{BA8CF6DC-A533-4927-8017-00161B75503B}"/>
+              </a:ext>
+            </a:extLst>
+          </p:cNvPr>
+          <p:cNvSpPr/>
+          <p:nvPr/>
+        </p:nvSpPr>
+        <p:spPr>
+          <a:xfrm>
+            <a:off x="6797462" y="2341577"/>
+            <a:ext cx="1220715" cy="1654628"/>
+          </a:xfrm>
+          <a:prstGeom prst="roundRect">
+            <a:avLst/>
+          </a:prstGeom>
+          <a:solidFill>
+            <a:schemeClr val="accent6">
+              <a:lumMod val="60000"/>
+              <a:lumOff val="40000"/>
+              <a:alpha val="30196"/>
+            </a:schemeClr>
+          </a:solidFill>
+        </p:spPr>
+        <p:style>
+          <a:lnRef idx="2">
+            <a:schemeClr val="accent1">
+              <a:shade val="50000"/>
+            </a:schemeClr>
+          </a:lnRef>
+          <a:fillRef idx="1">
+            <a:schemeClr val="accent1"/>
+          </a:fillRef>
+          <a:effectRef idx="0">
+            <a:schemeClr val="accent1"/>
+          </a:effectRef>
+          <a:fontRef idx="minor">
+            <a:schemeClr val="lt1"/>
+          </a:fontRef>
+        </p:style>
+        <p:txBody>
+          <a:bodyPr rtlCol="0" anchor="ctr"/>
+          <a:lstStyle/>
+          <a:p>
+            <a:pPr algn="ctr"/>
+            <a:r>
+              <a:rPr lang="en-US" sz="1000" dirty="0" err="1">
+                <a:ln w="0"/>
+                <a:solidFill>
+                  <a:schemeClr val="accent6">
+                    <a:lumMod val="50000"/>
+                  </a:schemeClr>
+                </a:solidFill>
+                <a:effectLst>
+                  <a:outerShdw blurRad="38100" dist="19050" dir="2700000" algn="tl" rotWithShape="0">
+                    <a:schemeClr val="dk1">
+                      <a:alpha val="40000"/>
+                    </a:schemeClr>
+                  </a:outerShdw>
+                </a:effectLst>
+                <a:highlight>
+                  <a:srgbClr val="FFFF00"/>
+                </a:highlight>
+              </a:rPr>
+              <a:t>QLabel</a:t>
+            </a:r>
+            <a:r>
+              <a:rPr lang="en-US" sz="1000" dirty="0">
+                <a:ln w="0"/>
+                <a:solidFill>
+                  <a:schemeClr val="accent6">
+                    <a:lumMod val="50000"/>
+                  </a:schemeClr>
+                </a:solidFill>
+                <a:effectLst>
+                  <a:outerShdw blurRad="38100" dist="19050" dir="2700000" algn="tl" rotWithShape="0">
+                    <a:schemeClr val="dk1">
+                      <a:alpha val="40000"/>
+                    </a:schemeClr>
+                  </a:outerShdw>
+                </a:effectLst>
+                <a:highlight>
+                  <a:srgbClr val="FFFF00"/>
+                </a:highlight>
+              </a:rPr>
+              <a:t> *</a:t>
+            </a:r>
+            <a:r>
+              <a:rPr lang="en-US" sz="1000" dirty="0" err="1">
+                <a:ln w="0"/>
+                <a:solidFill>
+                  <a:schemeClr val="accent6">
+                    <a:lumMod val="50000"/>
+                  </a:schemeClr>
+                </a:solidFill>
+                <a:effectLst>
+                  <a:outerShdw blurRad="38100" dist="19050" dir="2700000" algn="tl" rotWithShape="0">
+                    <a:schemeClr val="dk1">
+                      <a:alpha val="40000"/>
+                    </a:schemeClr>
+                  </a:outerShdw>
+                </a:effectLst>
+                <a:highlight>
+                  <a:srgbClr val="FFFF00"/>
+                </a:highlight>
+              </a:rPr>
+              <a:t>ParticipantCards</a:t>
+            </a:r>
+            <a:r>
+              <a:rPr lang="en-US" sz="1000" dirty="0">
+                <a:ln w="0"/>
+                <a:solidFill>
+                  <a:schemeClr val="accent6">
+                    <a:lumMod val="50000"/>
+                  </a:schemeClr>
+                </a:solidFill>
+                <a:effectLst>
+                  <a:outerShdw blurRad="38100" dist="19050" dir="2700000" algn="tl" rotWithShape="0">
+                    <a:schemeClr val="dk1">
+                      <a:alpha val="40000"/>
+                    </a:schemeClr>
+                  </a:outerShdw>
+                </a:effectLst>
+                <a:highlight>
+                  <a:srgbClr val="FFFF00"/>
+                </a:highlight>
+              </a:rPr>
+              <a:t>_[3] Owned by Dealer_</a:t>
+            </a:r>
+            <a:endParaRPr lang="en-CA" sz="1000" dirty="0">
+              <a:ln w="0"/>
+              <a:solidFill>
+                <a:schemeClr val="accent6">
+                  <a:lumMod val="50000"/>
+                </a:schemeClr>
+              </a:solidFill>
+              <a:effectLst>
+                <a:outerShdw blurRad="38100" dist="19050" dir="2700000" algn="tl" rotWithShape="0">
+                  <a:schemeClr val="dk1">
+                    <a:alpha val="40000"/>
+                  </a:schemeClr>
+                </a:outerShdw>
+              </a:effectLst>
+              <a:highlight>
+                <a:srgbClr val="FFFF00"/>
+              </a:highlight>
+            </a:endParaRPr>
+          </a:p>
+        </p:txBody>
+      </p:sp>
+      <p:sp>
+        <p:nvSpPr>
+          <p:cNvPr id="28" name="Rectangle: Rounded Corners 27">
+            <a:extLst>
+              <a:ext uri="{FF2B5EF4-FFF2-40B4-BE49-F238E27FC236}">
+                <a16:creationId xmlns:a16="http://schemas.microsoft.com/office/drawing/2014/main" id="{E7B85791-B83E-4BCC-8BB3-A16704AE60C1}"/>
+              </a:ext>
+            </a:extLst>
+          </p:cNvPr>
+          <p:cNvSpPr/>
+          <p:nvPr/>
+        </p:nvSpPr>
+        <p:spPr>
+          <a:xfrm>
+            <a:off x="2689435" y="4605807"/>
+            <a:ext cx="1220715" cy="1654628"/>
+          </a:xfrm>
+          <a:prstGeom prst="roundRect">
+            <a:avLst/>
+          </a:prstGeom>
+          <a:solidFill>
+            <a:srgbClr val="C345BA">
+              <a:alpha val="30196"/>
+            </a:srgbClr>
+          </a:solidFill>
+        </p:spPr>
+        <p:style>
+          <a:lnRef idx="2">
+            <a:schemeClr val="accent1">
+              <a:shade val="50000"/>
+            </a:schemeClr>
+          </a:lnRef>
+          <a:fillRef idx="1">
+            <a:schemeClr val="accent1"/>
+          </a:fillRef>
+          <a:effectRef idx="0">
+            <a:schemeClr val="accent1"/>
+          </a:effectRef>
+          <a:fontRef idx="minor">
+            <a:schemeClr val="lt1"/>
+          </a:fontRef>
+        </p:style>
+        <p:txBody>
+          <a:bodyPr rtlCol="0" anchor="ctr"/>
+          <a:lstStyle/>
+          <a:p>
+            <a:pPr algn="ctr"/>
+            <a:r>
+              <a:rPr lang="en-US" sz="1000" dirty="0" err="1">
+                <a:ln w="0"/>
+                <a:solidFill>
+                  <a:schemeClr val="accent6">
+                    <a:lumMod val="50000"/>
+                  </a:schemeClr>
+                </a:solidFill>
+                <a:effectLst>
+                  <a:outerShdw blurRad="38100" dist="19050" dir="2700000" algn="tl" rotWithShape="0">
+                    <a:schemeClr val="dk1">
+                      <a:alpha val="40000"/>
+                    </a:schemeClr>
+                  </a:outerShdw>
+                </a:effectLst>
+                <a:highlight>
+                  <a:srgbClr val="FF00FF"/>
+                </a:highlight>
+              </a:rPr>
+              <a:t>QLabel</a:t>
+            </a:r>
+            <a:r>
+              <a:rPr lang="en-US" sz="1000" dirty="0">
+                <a:ln w="0"/>
+                <a:solidFill>
+                  <a:schemeClr val="accent6">
+                    <a:lumMod val="50000"/>
+                  </a:schemeClr>
+                </a:solidFill>
+                <a:effectLst>
+                  <a:outerShdw blurRad="38100" dist="19050" dir="2700000" algn="tl" rotWithShape="0">
+                    <a:schemeClr val="dk1">
+                      <a:alpha val="40000"/>
+                    </a:schemeClr>
+                  </a:outerShdw>
+                </a:effectLst>
+                <a:highlight>
+                  <a:srgbClr val="FF00FF"/>
+                </a:highlight>
+              </a:rPr>
+              <a:t> *</a:t>
+            </a:r>
+            <a:r>
+              <a:rPr lang="en-US" sz="1000" dirty="0" err="1">
+                <a:ln w="0"/>
+                <a:solidFill>
+                  <a:schemeClr val="accent6">
+                    <a:lumMod val="50000"/>
+                  </a:schemeClr>
+                </a:solidFill>
+                <a:effectLst>
+                  <a:outerShdw blurRad="38100" dist="19050" dir="2700000" algn="tl" rotWithShape="0">
+                    <a:schemeClr val="dk1">
+                      <a:alpha val="40000"/>
+                    </a:schemeClr>
+                  </a:outerShdw>
+                </a:effectLst>
+                <a:highlight>
+                  <a:srgbClr val="FF00FF"/>
+                </a:highlight>
+              </a:rPr>
+              <a:t>ParticipantCards</a:t>
+            </a:r>
+            <a:r>
+              <a:rPr lang="en-US" sz="1000" dirty="0">
+                <a:ln w="0"/>
+                <a:solidFill>
+                  <a:schemeClr val="accent6">
+                    <a:lumMod val="50000"/>
+                  </a:schemeClr>
+                </a:solidFill>
+                <a:effectLst>
+                  <a:outerShdw blurRad="38100" dist="19050" dir="2700000" algn="tl" rotWithShape="0">
+                    <a:schemeClr val="dk1">
+                      <a:alpha val="40000"/>
+                    </a:schemeClr>
+                  </a:outerShdw>
+                </a:effectLst>
+                <a:highlight>
+                  <a:srgbClr val="FF00FF"/>
+                </a:highlight>
+              </a:rPr>
+              <a:t>_[0] Owned by Player_</a:t>
+            </a:r>
+            <a:endParaRPr lang="en-CA" sz="1000" dirty="0">
+              <a:ln w="0"/>
+              <a:solidFill>
+                <a:schemeClr val="accent6">
+                  <a:lumMod val="50000"/>
+                </a:schemeClr>
+              </a:solidFill>
+              <a:effectLst>
+                <a:outerShdw blurRad="38100" dist="19050" dir="2700000" algn="tl" rotWithShape="0">
+                  <a:schemeClr val="dk1">
+                    <a:alpha val="40000"/>
+                  </a:schemeClr>
+                </a:outerShdw>
+              </a:effectLst>
+              <a:highlight>
+                <a:srgbClr val="FF00FF"/>
+              </a:highlight>
+            </a:endParaRPr>
+          </a:p>
+        </p:txBody>
+      </p:sp>
+      <p:sp>
+        <p:nvSpPr>
+          <p:cNvPr id="29" name="Rectangle: Rounded Corners 28">
+            <a:extLst>
+              <a:ext uri="{FF2B5EF4-FFF2-40B4-BE49-F238E27FC236}">
+                <a16:creationId xmlns:a16="http://schemas.microsoft.com/office/drawing/2014/main" id="{BF83862D-67CB-4B4C-88C4-C22CF01BCFAB}"/>
+              </a:ext>
+            </a:extLst>
+          </p:cNvPr>
+          <p:cNvSpPr/>
+          <p:nvPr/>
+        </p:nvSpPr>
+        <p:spPr>
+          <a:xfrm>
+            <a:off x="4018960" y="4605807"/>
+            <a:ext cx="1270076" cy="1654628"/>
+          </a:xfrm>
+          <a:prstGeom prst="roundRect">
+            <a:avLst/>
+          </a:prstGeom>
+          <a:solidFill>
+            <a:srgbClr val="C345BA">
+              <a:alpha val="30196"/>
+            </a:srgbClr>
+          </a:solidFill>
+        </p:spPr>
+        <p:style>
+          <a:lnRef idx="2">
+            <a:schemeClr val="accent1">
+              <a:shade val="50000"/>
+            </a:schemeClr>
+          </a:lnRef>
+          <a:fillRef idx="1">
+            <a:schemeClr val="accent1"/>
+          </a:fillRef>
+          <a:effectRef idx="0">
+            <a:schemeClr val="accent1"/>
+          </a:effectRef>
+          <a:fontRef idx="minor">
+            <a:schemeClr val="lt1"/>
+          </a:fontRef>
+        </p:style>
+        <p:txBody>
+          <a:bodyPr rtlCol="0" anchor="ctr"/>
+          <a:lstStyle/>
+          <a:p>
+            <a:pPr algn="ctr"/>
+            <a:r>
+              <a:rPr lang="en-US" sz="1050" dirty="0" err="1">
+                <a:ln w="0"/>
+                <a:solidFill>
+                  <a:schemeClr val="accent6">
+                    <a:lumMod val="50000"/>
+                  </a:schemeClr>
+                </a:solidFill>
+                <a:effectLst>
+                  <a:outerShdw blurRad="38100" dist="19050" dir="2700000" algn="tl" rotWithShape="0">
+                    <a:schemeClr val="dk1">
+                      <a:alpha val="40000"/>
+                    </a:schemeClr>
+                  </a:outerShdw>
+                </a:effectLst>
+                <a:highlight>
+                  <a:srgbClr val="FF00FF"/>
+                </a:highlight>
+              </a:rPr>
+              <a:t>QLabel</a:t>
+            </a:r>
+            <a:r>
+              <a:rPr lang="en-US" sz="1050" dirty="0">
+                <a:ln w="0"/>
+                <a:solidFill>
+                  <a:schemeClr val="accent6">
+                    <a:lumMod val="50000"/>
+                  </a:schemeClr>
+                </a:solidFill>
+                <a:effectLst>
+                  <a:outerShdw blurRad="38100" dist="19050" dir="2700000" algn="tl" rotWithShape="0">
+                    <a:schemeClr val="dk1">
+                      <a:alpha val="40000"/>
+                    </a:schemeClr>
+                  </a:outerShdw>
+                </a:effectLst>
+                <a:highlight>
+                  <a:srgbClr val="FF00FF"/>
+                </a:highlight>
+              </a:rPr>
+              <a:t> *</a:t>
+            </a:r>
+            <a:r>
+              <a:rPr lang="en-US" sz="1050" dirty="0" err="1">
+                <a:ln w="0"/>
+                <a:solidFill>
+                  <a:schemeClr val="accent6">
+                    <a:lumMod val="50000"/>
+                  </a:schemeClr>
+                </a:solidFill>
+                <a:effectLst>
+                  <a:outerShdw blurRad="38100" dist="19050" dir="2700000" algn="tl" rotWithShape="0">
+                    <a:schemeClr val="dk1">
+                      <a:alpha val="40000"/>
+                    </a:schemeClr>
+                  </a:outerShdw>
+                </a:effectLst>
+                <a:highlight>
+                  <a:srgbClr val="FF00FF"/>
+                </a:highlight>
+              </a:rPr>
+              <a:t>ParticipantCards</a:t>
+            </a:r>
+            <a:r>
+              <a:rPr lang="en-US" sz="1050" dirty="0">
+                <a:ln w="0"/>
+                <a:solidFill>
+                  <a:schemeClr val="accent6">
+                    <a:lumMod val="50000"/>
+                  </a:schemeClr>
+                </a:solidFill>
+                <a:effectLst>
+                  <a:outerShdw blurRad="38100" dist="19050" dir="2700000" algn="tl" rotWithShape="0">
+                    <a:schemeClr val="dk1">
+                      <a:alpha val="40000"/>
+                    </a:schemeClr>
+                  </a:outerShdw>
+                </a:effectLst>
+                <a:highlight>
+                  <a:srgbClr val="FF00FF"/>
+                </a:highlight>
+              </a:rPr>
+              <a:t>_[1] Owned by Player_</a:t>
+            </a:r>
+            <a:endParaRPr lang="en-CA" sz="1050" dirty="0">
+              <a:ln w="0"/>
+              <a:solidFill>
+                <a:schemeClr val="accent6">
+                  <a:lumMod val="50000"/>
+                </a:schemeClr>
+              </a:solidFill>
+              <a:effectLst>
+                <a:outerShdw blurRad="38100" dist="19050" dir="2700000" algn="tl" rotWithShape="0">
+                  <a:schemeClr val="dk1">
+                    <a:alpha val="40000"/>
+                  </a:schemeClr>
+                </a:outerShdw>
+              </a:effectLst>
+              <a:highlight>
+                <a:srgbClr val="FF00FF"/>
+              </a:highlight>
+            </a:endParaRPr>
+          </a:p>
+        </p:txBody>
+      </p:sp>
+      <p:sp>
+        <p:nvSpPr>
+          <p:cNvPr id="30" name="Rectangle: Rounded Corners 29">
+            <a:extLst>
+              <a:ext uri="{FF2B5EF4-FFF2-40B4-BE49-F238E27FC236}">
+                <a16:creationId xmlns:a16="http://schemas.microsoft.com/office/drawing/2014/main" id="{45EAA70A-B8C5-4DF7-BB07-16AEC4154D9E}"/>
+              </a:ext>
+            </a:extLst>
+          </p:cNvPr>
+          <p:cNvSpPr/>
+          <p:nvPr/>
+        </p:nvSpPr>
+        <p:spPr>
+          <a:xfrm>
+            <a:off x="5361876" y="4605807"/>
+            <a:ext cx="1220715" cy="1654628"/>
+          </a:xfrm>
+          <a:prstGeom prst="roundRect">
+            <a:avLst/>
+          </a:prstGeom>
+          <a:solidFill>
+            <a:srgbClr val="C345BA">
+              <a:alpha val="30196"/>
+            </a:srgbClr>
+          </a:solidFill>
+        </p:spPr>
+        <p:style>
+          <a:lnRef idx="2">
+            <a:schemeClr val="accent1">
+              <a:shade val="50000"/>
+            </a:schemeClr>
+          </a:lnRef>
+          <a:fillRef idx="1">
+            <a:schemeClr val="accent1"/>
+          </a:fillRef>
+          <a:effectRef idx="0">
+            <a:schemeClr val="accent1"/>
+          </a:effectRef>
+          <a:fontRef idx="minor">
+            <a:schemeClr val="lt1"/>
+          </a:fontRef>
+        </p:style>
+        <p:txBody>
+          <a:bodyPr rtlCol="0" anchor="ctr"/>
+          <a:lstStyle/>
+          <a:p>
+            <a:pPr algn="ctr"/>
+            <a:r>
+              <a:rPr lang="en-US" sz="1000" dirty="0" err="1">
+                <a:ln w="0"/>
+                <a:solidFill>
+                  <a:schemeClr val="accent6">
+                    <a:lumMod val="50000"/>
+                  </a:schemeClr>
+                </a:solidFill>
+                <a:effectLst>
+                  <a:outerShdw blurRad="38100" dist="19050" dir="2700000" algn="tl" rotWithShape="0">
+                    <a:schemeClr val="dk1">
+                      <a:alpha val="40000"/>
+                    </a:schemeClr>
+                  </a:outerShdw>
+                </a:effectLst>
+                <a:highlight>
+                  <a:srgbClr val="FF00FF"/>
+                </a:highlight>
+              </a:rPr>
+              <a:t>QLabel</a:t>
+            </a:r>
+            <a:r>
+              <a:rPr lang="en-US" sz="1000" dirty="0">
+                <a:ln w="0"/>
+                <a:solidFill>
+                  <a:schemeClr val="accent6">
+                    <a:lumMod val="50000"/>
+                  </a:schemeClr>
+                </a:solidFill>
+                <a:effectLst>
+                  <a:outerShdw blurRad="38100" dist="19050" dir="2700000" algn="tl" rotWithShape="0">
+                    <a:schemeClr val="dk1">
+                      <a:alpha val="40000"/>
+                    </a:schemeClr>
+                  </a:outerShdw>
+                </a:effectLst>
+                <a:highlight>
+                  <a:srgbClr val="FF00FF"/>
+                </a:highlight>
+              </a:rPr>
+              <a:t> *</a:t>
+            </a:r>
+            <a:r>
+              <a:rPr lang="en-US" sz="1000" dirty="0" err="1">
+                <a:ln w="0"/>
+                <a:solidFill>
+                  <a:schemeClr val="accent6">
+                    <a:lumMod val="50000"/>
+                  </a:schemeClr>
+                </a:solidFill>
+                <a:effectLst>
+                  <a:outerShdw blurRad="38100" dist="19050" dir="2700000" algn="tl" rotWithShape="0">
+                    <a:schemeClr val="dk1">
+                      <a:alpha val="40000"/>
+                    </a:schemeClr>
+                  </a:outerShdw>
+                </a:effectLst>
+                <a:highlight>
+                  <a:srgbClr val="FF00FF"/>
+                </a:highlight>
+              </a:rPr>
+              <a:t>ParticipantCards</a:t>
+            </a:r>
+            <a:r>
+              <a:rPr lang="en-US" sz="1000" dirty="0">
+                <a:ln w="0"/>
+                <a:solidFill>
+                  <a:schemeClr val="accent6">
+                    <a:lumMod val="50000"/>
+                  </a:schemeClr>
+                </a:solidFill>
+                <a:effectLst>
+                  <a:outerShdw blurRad="38100" dist="19050" dir="2700000" algn="tl" rotWithShape="0">
+                    <a:schemeClr val="dk1">
+                      <a:alpha val="40000"/>
+                    </a:schemeClr>
+                  </a:outerShdw>
+                </a:effectLst>
+                <a:highlight>
+                  <a:srgbClr val="FF00FF"/>
+                </a:highlight>
+              </a:rPr>
+              <a:t>_[2] Owned by Player_</a:t>
+            </a:r>
+            <a:endParaRPr lang="en-CA" sz="1000" dirty="0">
+              <a:ln w="0"/>
+              <a:solidFill>
+                <a:schemeClr val="accent6">
+                  <a:lumMod val="50000"/>
+                </a:schemeClr>
+              </a:solidFill>
+              <a:effectLst>
+                <a:outerShdw blurRad="38100" dist="19050" dir="2700000" algn="tl" rotWithShape="0">
+                  <a:schemeClr val="dk1">
+                    <a:alpha val="40000"/>
+                  </a:schemeClr>
+                </a:outerShdw>
+              </a:effectLst>
+              <a:highlight>
+                <a:srgbClr val="FF00FF"/>
+              </a:highlight>
+            </a:endParaRPr>
+          </a:p>
+        </p:txBody>
+      </p:sp>
+      <p:sp>
+        <p:nvSpPr>
+          <p:cNvPr id="31" name="Rectangle: Rounded Corners 30">
+            <a:extLst>
+              <a:ext uri="{FF2B5EF4-FFF2-40B4-BE49-F238E27FC236}">
+                <a16:creationId xmlns:a16="http://schemas.microsoft.com/office/drawing/2014/main" id="{E39FCF65-A855-447E-9D20-BA471C4CE72B}"/>
+              </a:ext>
+            </a:extLst>
+          </p:cNvPr>
+          <p:cNvSpPr/>
+          <p:nvPr/>
+        </p:nvSpPr>
+        <p:spPr>
+          <a:xfrm>
+            <a:off x="6785587" y="4605807"/>
+            <a:ext cx="1313384" cy="1654628"/>
+          </a:xfrm>
+          <a:prstGeom prst="roundRect">
+            <a:avLst/>
+          </a:prstGeom>
+          <a:solidFill>
+            <a:srgbClr val="C345BA">
+              <a:alpha val="30196"/>
+            </a:srgbClr>
+          </a:solidFill>
+        </p:spPr>
+        <p:style>
+          <a:lnRef idx="2">
+            <a:schemeClr val="accent1">
+              <a:shade val="50000"/>
+            </a:schemeClr>
+          </a:lnRef>
+          <a:fillRef idx="1">
+            <a:schemeClr val="accent1"/>
+          </a:fillRef>
+          <a:effectRef idx="0">
+            <a:schemeClr val="accent1"/>
+          </a:effectRef>
+          <a:fontRef idx="minor">
+            <a:schemeClr val="lt1"/>
+          </a:fontRef>
+        </p:style>
+        <p:txBody>
+          <a:bodyPr rtlCol="0" anchor="ctr"/>
+          <a:lstStyle/>
+          <a:p>
+            <a:pPr algn="ctr"/>
+            <a:r>
+              <a:rPr lang="en-US" sz="1100" dirty="0" err="1">
+                <a:ln w="0"/>
+                <a:solidFill>
+                  <a:schemeClr val="accent6">
+                    <a:lumMod val="50000"/>
+                  </a:schemeClr>
+                </a:solidFill>
+                <a:effectLst>
+                  <a:outerShdw blurRad="38100" dist="19050" dir="2700000" algn="tl" rotWithShape="0">
+                    <a:schemeClr val="dk1">
+                      <a:alpha val="40000"/>
+                    </a:schemeClr>
+                  </a:outerShdw>
+                </a:effectLst>
+                <a:highlight>
+                  <a:srgbClr val="FF00FF"/>
+                </a:highlight>
+              </a:rPr>
+              <a:t>QLabel</a:t>
+            </a:r>
+            <a:r>
+              <a:rPr lang="en-US" sz="1100" dirty="0">
+                <a:ln w="0"/>
+                <a:solidFill>
+                  <a:schemeClr val="accent6">
+                    <a:lumMod val="50000"/>
+                  </a:schemeClr>
+                </a:solidFill>
+                <a:effectLst>
+                  <a:outerShdw blurRad="38100" dist="19050" dir="2700000" algn="tl" rotWithShape="0">
+                    <a:schemeClr val="dk1">
+                      <a:alpha val="40000"/>
+                    </a:schemeClr>
+                  </a:outerShdw>
+                </a:effectLst>
+                <a:highlight>
+                  <a:srgbClr val="FF00FF"/>
+                </a:highlight>
+              </a:rPr>
+              <a:t> *</a:t>
+            </a:r>
+            <a:r>
+              <a:rPr lang="en-US" sz="1100" dirty="0" err="1">
+                <a:ln w="0"/>
+                <a:solidFill>
+                  <a:schemeClr val="accent6">
+                    <a:lumMod val="50000"/>
+                  </a:schemeClr>
+                </a:solidFill>
+                <a:effectLst>
+                  <a:outerShdw blurRad="38100" dist="19050" dir="2700000" algn="tl" rotWithShape="0">
+                    <a:schemeClr val="dk1">
+                      <a:alpha val="40000"/>
+                    </a:schemeClr>
+                  </a:outerShdw>
+                </a:effectLst>
+                <a:highlight>
+                  <a:srgbClr val="FF00FF"/>
+                </a:highlight>
+              </a:rPr>
+              <a:t>ParticipantCards</a:t>
+            </a:r>
+            <a:r>
+              <a:rPr lang="en-US" sz="1100" dirty="0">
+                <a:ln w="0"/>
+                <a:solidFill>
+                  <a:schemeClr val="accent6">
+                    <a:lumMod val="50000"/>
+                  </a:schemeClr>
+                </a:solidFill>
+                <a:effectLst>
+                  <a:outerShdw blurRad="38100" dist="19050" dir="2700000" algn="tl" rotWithShape="0">
+                    <a:schemeClr val="dk1">
+                      <a:alpha val="40000"/>
+                    </a:schemeClr>
+                  </a:outerShdw>
+                </a:effectLst>
+                <a:highlight>
+                  <a:srgbClr val="FF00FF"/>
+                </a:highlight>
+              </a:rPr>
+              <a:t>_[3] Owned by Player_</a:t>
+            </a:r>
+            <a:endParaRPr lang="en-CA" sz="1100" dirty="0">
+              <a:ln w="0"/>
+              <a:solidFill>
+                <a:schemeClr val="accent6">
+                  <a:lumMod val="50000"/>
+                </a:schemeClr>
+              </a:solidFill>
+              <a:effectLst>
+                <a:outerShdw blurRad="38100" dist="19050" dir="2700000" algn="tl" rotWithShape="0">
+                  <a:schemeClr val="dk1">
+                    <a:alpha val="40000"/>
+                  </a:schemeClr>
+                </a:outerShdw>
+              </a:effectLst>
+              <a:highlight>
+                <a:srgbClr val="FF00FF"/>
+              </a:highlight>
+            </a:endParaRPr>
+          </a:p>
+        </p:txBody>
+      </p:sp>
+      <p:sp>
+        <p:nvSpPr>
+          <p:cNvPr id="38" name="Rectangle 37">
+            <a:extLst>
+              <a:ext uri="{FF2B5EF4-FFF2-40B4-BE49-F238E27FC236}">
+                <a16:creationId xmlns:a16="http://schemas.microsoft.com/office/drawing/2014/main" id="{59EDFF7F-C07F-498F-B19D-F143DA9DF8CF}"/>
+              </a:ext>
+            </a:extLst>
+          </p:cNvPr>
+          <p:cNvSpPr/>
+          <p:nvPr/>
+        </p:nvSpPr>
+        <p:spPr>
+          <a:xfrm>
+            <a:off x="182879" y="3066405"/>
+            <a:ext cx="1724297" cy="483366"/>
+          </a:xfrm>
+          <a:prstGeom prst="rect">
+            <a:avLst/>
+          </a:prstGeom>
+          <a:solidFill>
+            <a:schemeClr val="tx2">
+              <a:lumMod val="60000"/>
+              <a:lumOff val="40000"/>
+            </a:schemeClr>
+          </a:solidFill>
+          <a:ln w="38100">
+            <a:solidFill>
+              <a:schemeClr val="tx2"/>
+            </a:solidFill>
+          </a:ln>
+        </p:spPr>
+        <p:style>
+          <a:lnRef idx="2">
+            <a:schemeClr val="accent2">
+              <a:shade val="50000"/>
+            </a:schemeClr>
+          </a:lnRef>
+          <a:fillRef idx="1">
+            <a:schemeClr val="accent2"/>
+          </a:fillRef>
+          <a:effectRef idx="0">
+            <a:schemeClr val="accent2"/>
+          </a:effectRef>
+          <a:fontRef idx="minor">
+            <a:schemeClr val="lt1"/>
+          </a:fontRef>
+        </p:style>
+        <p:txBody>
+          <a:bodyPr rtlCol="0" anchor="ctr"/>
+          <a:lstStyle/>
+          <a:p>
+            <a:pPr algn="ctr"/>
+            <a:r>
+              <a:rPr lang="en-CA" sz="1000" dirty="0" err="1"/>
+              <a:t>QGroupBox</a:t>
+            </a:r>
+            <a:r>
+              <a:rPr lang="en-CA" sz="1000" b="1" dirty="0"/>
+              <a:t> *</a:t>
+            </a:r>
+            <a:r>
+              <a:rPr lang="en-CA" sz="1000" b="1" dirty="0" err="1"/>
+              <a:t>DealersCardPrompt</a:t>
+            </a:r>
+            <a:r>
+              <a:rPr lang="en-CA" sz="1000" b="1" dirty="0"/>
+              <a:t>_</a:t>
+            </a:r>
+          </a:p>
+        </p:txBody>
+      </p:sp>
+      <p:sp>
+        <p:nvSpPr>
+          <p:cNvPr id="5" name="Rectangle 4">
+            <a:extLst>
+              <a:ext uri="{FF2B5EF4-FFF2-40B4-BE49-F238E27FC236}">
+                <a16:creationId xmlns:a16="http://schemas.microsoft.com/office/drawing/2014/main" id="{82A23DF0-B702-4362-B0F2-CF1063C6E8AB}"/>
+              </a:ext>
+            </a:extLst>
+          </p:cNvPr>
+          <p:cNvSpPr/>
+          <p:nvPr/>
+        </p:nvSpPr>
+        <p:spPr>
+          <a:xfrm>
+            <a:off x="8482149" y="2116183"/>
+            <a:ext cx="1018755" cy="661851"/>
+          </a:xfrm>
+          <a:prstGeom prst="rect">
+            <a:avLst/>
+          </a:prstGeom>
+          <a:solidFill>
+            <a:srgbClr val="ED7D31">
+              <a:alpha val="40000"/>
+            </a:srgbClr>
+          </a:solidFill>
+        </p:spPr>
+        <p:style>
+          <a:lnRef idx="2">
+            <a:schemeClr val="accent2">
+              <a:shade val="50000"/>
+            </a:schemeClr>
+          </a:lnRef>
+          <a:fillRef idx="1">
+            <a:schemeClr val="accent2"/>
+          </a:fillRef>
+          <a:effectRef idx="0">
+            <a:schemeClr val="accent2"/>
+          </a:effectRef>
+          <a:fontRef idx="minor">
+            <a:schemeClr val="lt1"/>
+          </a:fontRef>
+        </p:style>
+        <p:txBody>
+          <a:bodyPr rtlCol="0" anchor="ctr"/>
+          <a:lstStyle/>
+          <a:p>
+            <a:pPr algn="ctr"/>
+            <a:endParaRPr lang="en-CA"/>
+          </a:p>
+        </p:txBody>
+      </p:sp>
+      <p:sp>
+        <p:nvSpPr>
+          <p:cNvPr id="47" name="Rectangle 46">
+            <a:extLst>
+              <a:ext uri="{FF2B5EF4-FFF2-40B4-BE49-F238E27FC236}">
+                <a16:creationId xmlns:a16="http://schemas.microsoft.com/office/drawing/2014/main" id="{3BB9DBB3-DC65-4525-9549-1E9294AB2647}"/>
+              </a:ext>
+            </a:extLst>
+          </p:cNvPr>
+          <p:cNvSpPr/>
+          <p:nvPr/>
+        </p:nvSpPr>
+        <p:spPr>
+          <a:xfrm>
+            <a:off x="9998181" y="2037805"/>
+            <a:ext cx="1718356" cy="439784"/>
+          </a:xfrm>
+          <a:prstGeom prst="rect">
+            <a:avLst/>
+          </a:prstGeom>
+          <a:solidFill>
+            <a:srgbClr val="ED7D31"/>
+          </a:solidFill>
+        </p:spPr>
+        <p:style>
+          <a:lnRef idx="2">
+            <a:schemeClr val="accent2">
+              <a:shade val="50000"/>
+            </a:schemeClr>
+          </a:lnRef>
+          <a:fillRef idx="1">
+            <a:schemeClr val="accent2"/>
+          </a:fillRef>
+          <a:effectRef idx="0">
+            <a:schemeClr val="accent2"/>
+          </a:effectRef>
+          <a:fontRef idx="minor">
+            <a:schemeClr val="lt1"/>
+          </a:fontRef>
+        </p:style>
+        <p:txBody>
+          <a:bodyPr rtlCol="0" anchor="ctr"/>
+          <a:lstStyle/>
+          <a:p>
+            <a:pPr algn="ctr"/>
+            <a:r>
+              <a:rPr lang="en-CA" sz="1100" dirty="0" err="1"/>
+              <a:t>QGroupBox</a:t>
+            </a:r>
+            <a:r>
+              <a:rPr lang="en-CA" sz="1100" dirty="0"/>
+              <a:t> </a:t>
+            </a:r>
+            <a:r>
+              <a:rPr lang="en-CA" sz="1100" b="1" dirty="0"/>
+              <a:t>*</a:t>
+            </a:r>
+            <a:r>
+              <a:rPr lang="en-CA" sz="1100" b="1" dirty="0" err="1"/>
+              <a:t>DealersFundPrompt</a:t>
+            </a:r>
+            <a:r>
+              <a:rPr lang="en-CA" sz="1100" b="1" dirty="0"/>
+              <a:t>_</a:t>
+            </a:r>
+          </a:p>
+        </p:txBody>
+      </p:sp>
+      <p:cxnSp>
+        <p:nvCxnSpPr>
+          <p:cNvPr id="19" name="Straight Connector 18">
+            <a:extLst>
+              <a:ext uri="{FF2B5EF4-FFF2-40B4-BE49-F238E27FC236}">
+                <a16:creationId xmlns:a16="http://schemas.microsoft.com/office/drawing/2014/main" id="{BC1A3FBB-3051-4181-A64E-F872B70D2B09}"/>
+              </a:ext>
+            </a:extLst>
+          </p:cNvPr>
+          <p:cNvCxnSpPr>
+            <a:cxnSpLocks/>
+            <a:stCxn id="5" idx="3"/>
+            <a:endCxn id="47" idx="1"/>
+          </p:cNvCxnSpPr>
+          <p:nvPr/>
+        </p:nvCxnSpPr>
+        <p:spPr>
+          <a:xfrm flipV="1">
+            <a:off x="9500904" y="2257697"/>
+            <a:ext cx="497277" cy="189412"/>
+          </a:xfrm>
+          <a:prstGeom prst="line">
+            <a:avLst/>
+          </a:prstGeom>
+          <a:ln w="28575"/>
+        </p:spPr>
+        <p:style>
+          <a:lnRef idx="1">
+            <a:schemeClr val="accent2"/>
+          </a:lnRef>
+          <a:fillRef idx="0">
+            <a:schemeClr val="accent2"/>
+          </a:fillRef>
+          <a:effectRef idx="0">
+            <a:schemeClr val="accent2"/>
+          </a:effectRef>
+          <a:fontRef idx="minor">
+            <a:schemeClr val="tx1"/>
+          </a:fontRef>
+        </p:style>
+      </p:cxnSp>
+      <p:sp>
+        <p:nvSpPr>
+          <p:cNvPr id="76" name="Rectangle 75">
+            <a:extLst>
+              <a:ext uri="{FF2B5EF4-FFF2-40B4-BE49-F238E27FC236}">
+                <a16:creationId xmlns:a16="http://schemas.microsoft.com/office/drawing/2014/main" id="{E83266E9-82BE-4EDD-86C1-4F1C5D79E589}"/>
+              </a:ext>
+            </a:extLst>
+          </p:cNvPr>
+          <p:cNvSpPr/>
+          <p:nvPr/>
+        </p:nvSpPr>
+        <p:spPr>
+          <a:xfrm>
+            <a:off x="8489271" y="3296195"/>
+            <a:ext cx="1018755" cy="661851"/>
+          </a:xfrm>
+          <a:prstGeom prst="rect">
+            <a:avLst/>
+          </a:prstGeom>
+          <a:solidFill>
+            <a:srgbClr val="ED7D31">
+              <a:alpha val="40000"/>
+            </a:srgbClr>
+          </a:solidFill>
+        </p:spPr>
+        <p:style>
+          <a:lnRef idx="2">
+            <a:schemeClr val="accent2">
+              <a:shade val="50000"/>
+            </a:schemeClr>
+          </a:lnRef>
+          <a:fillRef idx="1">
+            <a:schemeClr val="accent2"/>
+          </a:fillRef>
+          <a:effectRef idx="0">
+            <a:schemeClr val="accent2"/>
+          </a:effectRef>
+          <a:fontRef idx="minor">
+            <a:schemeClr val="lt1"/>
+          </a:fontRef>
+        </p:style>
+        <p:txBody>
+          <a:bodyPr rtlCol="0" anchor="ctr"/>
+          <a:lstStyle/>
+          <a:p>
+            <a:pPr algn="ctr"/>
+            <a:endParaRPr lang="en-CA"/>
+          </a:p>
+        </p:txBody>
+      </p:sp>
+      <p:sp>
+        <p:nvSpPr>
+          <p:cNvPr id="77" name="Rectangle 76">
+            <a:extLst>
+              <a:ext uri="{FF2B5EF4-FFF2-40B4-BE49-F238E27FC236}">
+                <a16:creationId xmlns:a16="http://schemas.microsoft.com/office/drawing/2014/main" id="{5E744536-621B-4926-BF57-313BDB4DD32E}"/>
+              </a:ext>
+            </a:extLst>
+          </p:cNvPr>
+          <p:cNvSpPr/>
+          <p:nvPr/>
+        </p:nvSpPr>
+        <p:spPr>
+          <a:xfrm>
+            <a:off x="10005303" y="3217817"/>
+            <a:ext cx="1718356" cy="439784"/>
+          </a:xfrm>
+          <a:prstGeom prst="rect">
+            <a:avLst/>
+          </a:prstGeom>
+          <a:solidFill>
+            <a:srgbClr val="ED7D31"/>
+          </a:solidFill>
+        </p:spPr>
+        <p:style>
+          <a:lnRef idx="2">
+            <a:schemeClr val="accent2">
+              <a:shade val="50000"/>
+            </a:schemeClr>
+          </a:lnRef>
+          <a:fillRef idx="1">
+            <a:schemeClr val="accent2"/>
+          </a:fillRef>
+          <a:effectRef idx="0">
+            <a:schemeClr val="accent2"/>
+          </a:effectRef>
+          <a:fontRef idx="minor">
+            <a:schemeClr val="lt1"/>
+          </a:fontRef>
+        </p:style>
+        <p:txBody>
+          <a:bodyPr rtlCol="0" anchor="ctr"/>
+          <a:lstStyle/>
+          <a:p>
+            <a:pPr algn="ctr"/>
+            <a:r>
+              <a:rPr lang="en-CA" sz="1100" dirty="0" err="1"/>
+              <a:t>QGroupBox</a:t>
+            </a:r>
+            <a:r>
+              <a:rPr lang="en-CA" sz="1100" dirty="0"/>
+              <a:t> </a:t>
+            </a:r>
+            <a:r>
+              <a:rPr lang="en-CA" sz="1100" b="1" dirty="0"/>
+              <a:t>*</a:t>
+            </a:r>
+            <a:r>
+              <a:rPr lang="en-CA" sz="1100" b="1" dirty="0" err="1"/>
+              <a:t>ScoreBoardPrompt</a:t>
+            </a:r>
+            <a:r>
+              <a:rPr lang="en-CA" sz="1100" b="1" dirty="0"/>
+              <a:t>_</a:t>
+            </a:r>
+          </a:p>
+        </p:txBody>
+      </p:sp>
+      <p:cxnSp>
+        <p:nvCxnSpPr>
+          <p:cNvPr id="78" name="Straight Connector 77">
+            <a:extLst>
+              <a:ext uri="{FF2B5EF4-FFF2-40B4-BE49-F238E27FC236}">
+                <a16:creationId xmlns:a16="http://schemas.microsoft.com/office/drawing/2014/main" id="{56075063-1EB8-4DA8-BE4A-D17CCBAC456A}"/>
+              </a:ext>
+            </a:extLst>
+          </p:cNvPr>
+          <p:cNvCxnSpPr>
+            <a:cxnSpLocks/>
+            <a:stCxn id="76" idx="3"/>
+            <a:endCxn id="77" idx="1"/>
+          </p:cNvCxnSpPr>
+          <p:nvPr/>
+        </p:nvCxnSpPr>
+        <p:spPr>
+          <a:xfrm flipV="1">
+            <a:off x="9508026" y="3437709"/>
+            <a:ext cx="497277" cy="189412"/>
+          </a:xfrm>
+          <a:prstGeom prst="line">
+            <a:avLst/>
+          </a:prstGeom>
+          <a:ln w="28575"/>
+        </p:spPr>
+        <p:style>
+          <a:lnRef idx="1">
+            <a:schemeClr val="accent2"/>
+          </a:lnRef>
+          <a:fillRef idx="0">
+            <a:schemeClr val="accent2"/>
+          </a:fillRef>
+          <a:effectRef idx="0">
+            <a:schemeClr val="accent2"/>
+          </a:effectRef>
+          <a:fontRef idx="minor">
+            <a:schemeClr val="tx1"/>
+          </a:fontRef>
+        </p:style>
+      </p:cxnSp>
+      <p:sp>
+        <p:nvSpPr>
+          <p:cNvPr id="81" name="Rectangle 80">
+            <a:extLst>
+              <a:ext uri="{FF2B5EF4-FFF2-40B4-BE49-F238E27FC236}">
+                <a16:creationId xmlns:a16="http://schemas.microsoft.com/office/drawing/2014/main" id="{01F46505-9145-454E-8D2D-DB33E1AA8E0A}"/>
+              </a:ext>
+            </a:extLst>
+          </p:cNvPr>
+          <p:cNvSpPr/>
+          <p:nvPr/>
+        </p:nvSpPr>
+        <p:spPr>
+          <a:xfrm>
+            <a:off x="8489271" y="4464293"/>
+            <a:ext cx="1018755" cy="661851"/>
+          </a:xfrm>
+          <a:prstGeom prst="rect">
+            <a:avLst/>
+          </a:prstGeom>
+          <a:solidFill>
+            <a:srgbClr val="ED7D31">
+              <a:alpha val="40000"/>
+            </a:srgbClr>
+          </a:solidFill>
+        </p:spPr>
+        <p:style>
+          <a:lnRef idx="2">
+            <a:schemeClr val="accent2">
+              <a:shade val="50000"/>
+            </a:schemeClr>
+          </a:lnRef>
+          <a:fillRef idx="1">
+            <a:schemeClr val="accent2"/>
+          </a:fillRef>
+          <a:effectRef idx="0">
+            <a:schemeClr val="accent2"/>
+          </a:effectRef>
+          <a:fontRef idx="minor">
+            <a:schemeClr val="lt1"/>
+          </a:fontRef>
+        </p:style>
+        <p:txBody>
+          <a:bodyPr rtlCol="0" anchor="ctr"/>
+          <a:lstStyle/>
+          <a:p>
+            <a:pPr algn="ctr"/>
+            <a:endParaRPr lang="en-CA"/>
+          </a:p>
+        </p:txBody>
+      </p:sp>
+      <p:sp>
+        <p:nvSpPr>
+          <p:cNvPr id="82" name="Rectangle 81">
+            <a:extLst>
+              <a:ext uri="{FF2B5EF4-FFF2-40B4-BE49-F238E27FC236}">
+                <a16:creationId xmlns:a16="http://schemas.microsoft.com/office/drawing/2014/main" id="{48D4B415-B51C-4F4E-A84F-01E94FF591F0}"/>
+              </a:ext>
+            </a:extLst>
+          </p:cNvPr>
+          <p:cNvSpPr/>
+          <p:nvPr/>
+        </p:nvSpPr>
+        <p:spPr>
+          <a:xfrm>
+            <a:off x="10014011" y="4162697"/>
+            <a:ext cx="1934149" cy="1027612"/>
+          </a:xfrm>
+          <a:prstGeom prst="rect">
+            <a:avLst/>
+          </a:prstGeom>
+          <a:solidFill>
+            <a:srgbClr val="ED7D31"/>
+          </a:solidFill>
+        </p:spPr>
+        <p:style>
+          <a:lnRef idx="2">
+            <a:schemeClr val="accent2">
+              <a:shade val="50000"/>
+            </a:schemeClr>
+          </a:lnRef>
+          <a:fillRef idx="1">
+            <a:schemeClr val="accent2"/>
+          </a:fillRef>
+          <a:effectRef idx="0">
+            <a:schemeClr val="accent2"/>
+          </a:effectRef>
+          <a:fontRef idx="minor">
+            <a:schemeClr val="lt1"/>
+          </a:fontRef>
+        </p:style>
+        <p:txBody>
+          <a:bodyPr rtlCol="0" anchor="ctr"/>
+          <a:lstStyle/>
+          <a:p>
+            <a:pPr algn="ctr"/>
+            <a:r>
+              <a:rPr lang="en-CA" sz="1100" dirty="0" err="1"/>
+              <a:t>QGroupBox</a:t>
+            </a:r>
+            <a:r>
+              <a:rPr lang="en-CA" sz="1100" dirty="0"/>
+              <a:t> </a:t>
+            </a:r>
+            <a:r>
+              <a:rPr lang="en-CA" sz="1100" b="1" dirty="0"/>
+              <a:t>*</a:t>
+            </a:r>
+            <a:r>
+              <a:rPr lang="en-CA" sz="1100" b="1" dirty="0" err="1"/>
+              <a:t>HitNStayPrompt</a:t>
+            </a:r>
+            <a:r>
+              <a:rPr lang="en-CA" sz="1100" b="1" dirty="0"/>
+              <a:t>_</a:t>
+            </a:r>
+          </a:p>
+          <a:p>
+            <a:pPr algn="ctr"/>
+            <a:r>
+              <a:rPr lang="en-CA" sz="1100" dirty="0"/>
+              <a:t>Here, we will have </a:t>
+            </a:r>
+            <a:r>
+              <a:rPr lang="en-CA" sz="1100" b="1" dirty="0"/>
+              <a:t>*</a:t>
+            </a:r>
+            <a:r>
+              <a:rPr lang="en-CA" sz="1100" b="1" dirty="0" err="1"/>
+              <a:t>FirstBetPrompt</a:t>
+            </a:r>
+            <a:r>
+              <a:rPr lang="en-CA" sz="1100" b="1" dirty="0"/>
+              <a:t>_ </a:t>
+            </a:r>
+            <a:r>
+              <a:rPr lang="en-CA" sz="1100" dirty="0"/>
+              <a:t>and </a:t>
+            </a:r>
+            <a:r>
+              <a:rPr lang="en-CA" sz="1100" b="1" dirty="0"/>
+              <a:t>*</a:t>
+            </a:r>
+            <a:r>
+              <a:rPr lang="en-CA" sz="1100" b="1" dirty="0" err="1"/>
+              <a:t>MessageBoxPrompt</a:t>
+            </a:r>
+            <a:r>
+              <a:rPr lang="en-CA" sz="1100" b="1" dirty="0"/>
+              <a:t>_ </a:t>
+            </a:r>
+            <a:r>
+              <a:rPr lang="en-CA" sz="1100" dirty="0"/>
+              <a:t>as well</a:t>
+            </a:r>
+          </a:p>
+        </p:txBody>
+      </p:sp>
+      <p:cxnSp>
+        <p:nvCxnSpPr>
+          <p:cNvPr id="83" name="Straight Connector 82">
+            <a:extLst>
+              <a:ext uri="{FF2B5EF4-FFF2-40B4-BE49-F238E27FC236}">
+                <a16:creationId xmlns:a16="http://schemas.microsoft.com/office/drawing/2014/main" id="{4BCA0906-2B84-4CF1-84BB-C11CEC6665F6}"/>
+              </a:ext>
+            </a:extLst>
+          </p:cNvPr>
+          <p:cNvCxnSpPr>
+            <a:cxnSpLocks/>
+            <a:stCxn id="81" idx="3"/>
+            <a:endCxn id="82" idx="1"/>
+          </p:cNvCxnSpPr>
+          <p:nvPr/>
+        </p:nvCxnSpPr>
+        <p:spPr>
+          <a:xfrm flipV="1">
+            <a:off x="9508026" y="4676503"/>
+            <a:ext cx="505985" cy="118716"/>
+          </a:xfrm>
+          <a:prstGeom prst="line">
+            <a:avLst/>
+          </a:prstGeom>
+          <a:ln w="28575"/>
+        </p:spPr>
+        <p:style>
+          <a:lnRef idx="1">
+            <a:schemeClr val="accent2"/>
+          </a:lnRef>
+          <a:fillRef idx="0">
+            <a:schemeClr val="accent2"/>
+          </a:fillRef>
+          <a:effectRef idx="0">
+            <a:schemeClr val="accent2"/>
+          </a:effectRef>
+          <a:fontRef idx="minor">
+            <a:schemeClr val="tx1"/>
+          </a:fontRef>
+        </p:style>
+      </p:cxnSp>
+    </p:spTree>
+    <p:extLst>
+      <p:ext uri="{BB962C8B-B14F-4D97-AF65-F5344CB8AC3E}">
+        <p14:creationId xmlns:p14="http://schemas.microsoft.com/office/powerpoint/2010/main" val="1800708929"/>
       </p:ext>
     </p:extLst>
   </p:cSld>

</xml_diff>